<commit_message>
added description of accessing the gateway
</commit_message>
<xml_diff>
--- a/Telemetry Gateway Monitoring.pptx
+++ b/Telemetry Gateway Monitoring.pptx
@@ -7529,7 +7529,7 @@
           <a:p>
             <a:fld id="{63CA2310-8BCF-4A82-9E14-004A80B6FD7C}" type="datetimeFigureOut">
               <a:rPr lang="de-AT" smtClean="0"/>
-              <a:t>05.03.2019</a:t>
+              <a:t>06.03.2019</a:t>
             </a:fld>
             <a:endParaRPr lang="de-AT"/>
           </a:p>
@@ -7946,7 +7946,7 @@
           <a:p>
             <a:fld id="{04B7B1CB-EE3B-4A3E-A31C-A53455453B89}" type="datetime1">
               <a:rPr lang="de-AT" smtClean="0"/>
-              <a:t>05.03.2019</a:t>
+              <a:t>06.03.2019</a:t>
             </a:fld>
             <a:endParaRPr lang="de-AT"/>
           </a:p>
@@ -8019,13 +8019,13 @@
   <p:clrMapOvr>
     <a:masterClrMapping/>
   </p:clrMapOvr>
-  <mc:AlternateContent xmlns:mc="http://schemas.openxmlformats.org/markup-compatibility/2006">
-    <mc:Choice xmlns:p14="http://schemas.microsoft.com/office/powerpoint/2010/main" Requires="p14">
+  <mc:AlternateContent xmlns:mc="http://schemas.openxmlformats.org/markup-compatibility/2006" xmlns:p14="http://schemas.microsoft.com/office/powerpoint/2010/main">
+    <mc:Choice Requires="p14">
       <p:transition spd="slow">
         <p14:pan/>
       </p:transition>
     </mc:Choice>
-    <mc:Fallback>
+    <mc:Fallback xmlns="">
       <p:transition spd="slow">
         <p:fade/>
       </p:transition>
@@ -8161,7 +8161,7 @@
           <a:p>
             <a:fld id="{903E7589-FFE5-4C1C-A17A-661FFD6F84A5}" type="datetime1">
               <a:rPr lang="de-AT" smtClean="0"/>
-              <a:t>05.03.2019</a:t>
+              <a:t>06.03.2019</a:t>
             </a:fld>
             <a:endParaRPr lang="de-AT"/>
           </a:p>
@@ -8234,13 +8234,13 @@
   <p:clrMapOvr>
     <a:masterClrMapping/>
   </p:clrMapOvr>
-  <mc:AlternateContent xmlns:mc="http://schemas.openxmlformats.org/markup-compatibility/2006">
-    <mc:Choice xmlns:p14="http://schemas.microsoft.com/office/powerpoint/2010/main" Requires="p14">
+  <mc:AlternateContent xmlns:mc="http://schemas.openxmlformats.org/markup-compatibility/2006" xmlns:p14="http://schemas.microsoft.com/office/powerpoint/2010/main">
+    <mc:Choice Requires="p14">
       <p:transition spd="slow">
         <p14:pan/>
       </p:transition>
     </mc:Choice>
-    <mc:Fallback>
+    <mc:Fallback xmlns="">
       <p:transition spd="slow">
         <p:fade/>
       </p:transition>
@@ -8386,7 +8386,7 @@
           <a:p>
             <a:fld id="{67363B0C-4E91-4AEE-9453-15AD6684103F}" type="datetime1">
               <a:rPr lang="de-AT" smtClean="0"/>
-              <a:t>05.03.2019</a:t>
+              <a:t>06.03.2019</a:t>
             </a:fld>
             <a:endParaRPr lang="de-AT"/>
           </a:p>
@@ -8459,13 +8459,13 @@
   <p:clrMapOvr>
     <a:masterClrMapping/>
   </p:clrMapOvr>
-  <mc:AlternateContent xmlns:mc="http://schemas.openxmlformats.org/markup-compatibility/2006">
-    <mc:Choice xmlns:p14="http://schemas.microsoft.com/office/powerpoint/2010/main" Requires="p14">
+  <mc:AlternateContent xmlns:mc="http://schemas.openxmlformats.org/markup-compatibility/2006" xmlns:p14="http://schemas.microsoft.com/office/powerpoint/2010/main">
+    <mc:Choice Requires="p14">
       <p:transition spd="slow">
         <p14:pan/>
       </p:transition>
     </mc:Choice>
-    <mc:Fallback>
+    <mc:Fallback xmlns="">
       <p:transition spd="slow">
         <p:fade/>
       </p:transition>
@@ -8601,7 +8601,7 @@
           <a:p>
             <a:fld id="{FD6292B7-70A6-4C50-B923-B35761BCED52}" type="datetime1">
               <a:rPr lang="de-AT" smtClean="0"/>
-              <a:t>05.03.2019</a:t>
+              <a:t>06.03.2019</a:t>
             </a:fld>
             <a:endParaRPr lang="de-AT"/>
           </a:p>
@@ -8674,13 +8674,13 @@
   <p:clrMapOvr>
     <a:masterClrMapping/>
   </p:clrMapOvr>
-  <mc:AlternateContent xmlns:mc="http://schemas.openxmlformats.org/markup-compatibility/2006">
-    <mc:Choice xmlns:p14="http://schemas.microsoft.com/office/powerpoint/2010/main" Requires="p14">
+  <mc:AlternateContent xmlns:mc="http://schemas.openxmlformats.org/markup-compatibility/2006" xmlns:p14="http://schemas.microsoft.com/office/powerpoint/2010/main">
+    <mc:Choice Requires="p14">
       <p:transition spd="slow">
         <p14:pan/>
       </p:transition>
     </mc:Choice>
-    <mc:Fallback>
+    <mc:Fallback xmlns="">
       <p:transition spd="slow">
         <p:fade/>
       </p:transition>
@@ -8892,7 +8892,7 @@
           <a:p>
             <a:fld id="{375F7439-D609-4E1B-818A-B2C3580B9669}" type="datetime1">
               <a:rPr lang="de-AT" smtClean="0"/>
-              <a:t>05.03.2019</a:t>
+              <a:t>06.03.2019</a:t>
             </a:fld>
             <a:endParaRPr lang="de-AT"/>
           </a:p>
@@ -8965,13 +8965,13 @@
   <p:clrMapOvr>
     <a:masterClrMapping/>
   </p:clrMapOvr>
-  <mc:AlternateContent xmlns:mc="http://schemas.openxmlformats.org/markup-compatibility/2006">
-    <mc:Choice xmlns:p14="http://schemas.microsoft.com/office/powerpoint/2010/main" Requires="p14">
+  <mc:AlternateContent xmlns:mc="http://schemas.openxmlformats.org/markup-compatibility/2006" xmlns:p14="http://schemas.microsoft.com/office/powerpoint/2010/main">
+    <mc:Choice Requires="p14">
       <p:transition spd="slow">
         <p14:pan/>
       </p:transition>
     </mc:Choice>
-    <mc:Fallback>
+    <mc:Fallback xmlns="">
       <p:transition spd="slow">
         <p:fade/>
       </p:transition>
@@ -9175,7 +9175,7 @@
           <a:p>
             <a:fld id="{56C603BB-499A-400B-9575-F941A4FF7CB0}" type="datetime1">
               <a:rPr lang="de-AT" smtClean="0"/>
-              <a:t>05.03.2019</a:t>
+              <a:t>06.03.2019</a:t>
             </a:fld>
             <a:endParaRPr lang="de-AT"/>
           </a:p>
@@ -9248,13 +9248,13 @@
   <p:clrMapOvr>
     <a:masterClrMapping/>
   </p:clrMapOvr>
-  <mc:AlternateContent xmlns:mc="http://schemas.openxmlformats.org/markup-compatibility/2006">
-    <mc:Choice xmlns:p14="http://schemas.microsoft.com/office/powerpoint/2010/main" Requires="p14">
+  <mc:AlternateContent xmlns:mc="http://schemas.openxmlformats.org/markup-compatibility/2006" xmlns:p14="http://schemas.microsoft.com/office/powerpoint/2010/main">
+    <mc:Choice Requires="p14">
       <p:transition spd="slow">
         <p14:pan/>
       </p:transition>
     </mc:Choice>
-    <mc:Fallback>
+    <mc:Fallback xmlns="">
       <p:transition spd="slow">
         <p:fade/>
       </p:transition>
@@ -9605,7 +9605,7 @@
           <a:p>
             <a:fld id="{248E0D6C-5F53-4BF6-B217-0202DDFB8ECF}" type="datetime1">
               <a:rPr lang="de-AT" smtClean="0"/>
-              <a:t>05.03.2019</a:t>
+              <a:t>06.03.2019</a:t>
             </a:fld>
             <a:endParaRPr lang="de-AT"/>
           </a:p>
@@ -9678,13 +9678,13 @@
   <p:clrMapOvr>
     <a:masterClrMapping/>
   </p:clrMapOvr>
-  <mc:AlternateContent xmlns:mc="http://schemas.openxmlformats.org/markup-compatibility/2006">
-    <mc:Choice xmlns:p14="http://schemas.microsoft.com/office/powerpoint/2010/main" Requires="p14">
+  <mc:AlternateContent xmlns:mc="http://schemas.openxmlformats.org/markup-compatibility/2006" xmlns:p14="http://schemas.microsoft.com/office/powerpoint/2010/main">
+    <mc:Choice Requires="p14">
       <p:transition spd="slow">
         <p14:pan/>
       </p:transition>
     </mc:Choice>
-    <mc:Fallback>
+    <mc:Fallback xmlns="">
       <p:transition spd="slow">
         <p:fade/>
       </p:transition>
@@ -9762,7 +9762,7 @@
           <a:p>
             <a:fld id="{87B8DEF8-B6CD-4ABF-B782-D220D65E7EB0}" type="datetime1">
               <a:rPr lang="de-AT" smtClean="0"/>
-              <a:t>05.03.2019</a:t>
+              <a:t>06.03.2019</a:t>
             </a:fld>
             <a:endParaRPr lang="de-AT"/>
           </a:p>
@@ -9835,13 +9835,13 @@
   <p:clrMapOvr>
     <a:masterClrMapping/>
   </p:clrMapOvr>
-  <mc:AlternateContent xmlns:mc="http://schemas.openxmlformats.org/markup-compatibility/2006">
-    <mc:Choice xmlns:p14="http://schemas.microsoft.com/office/powerpoint/2010/main" Requires="p14">
+  <mc:AlternateContent xmlns:mc="http://schemas.openxmlformats.org/markup-compatibility/2006" xmlns:p14="http://schemas.microsoft.com/office/powerpoint/2010/main">
+    <mc:Choice Requires="p14">
       <p:transition spd="slow">
         <p14:pan/>
       </p:transition>
     </mc:Choice>
-    <mc:Fallback>
+    <mc:Fallback xmlns="">
       <p:transition spd="slow">
         <p:fade/>
       </p:transition>
@@ -9890,7 +9890,7 @@
           <a:p>
             <a:fld id="{02BFEA8B-0EEA-49BE-BC19-2474A17A97DD}" type="datetime1">
               <a:rPr lang="de-AT" smtClean="0"/>
-              <a:t>05.03.2019</a:t>
+              <a:t>06.03.2019</a:t>
             </a:fld>
             <a:endParaRPr lang="de-AT"/>
           </a:p>
@@ -9963,13 +9963,13 @@
   <p:clrMapOvr>
     <a:masterClrMapping/>
   </p:clrMapOvr>
-  <mc:AlternateContent xmlns:mc="http://schemas.openxmlformats.org/markup-compatibility/2006">
-    <mc:Choice xmlns:p14="http://schemas.microsoft.com/office/powerpoint/2010/main" Requires="p14">
+  <mc:AlternateContent xmlns:mc="http://schemas.openxmlformats.org/markup-compatibility/2006" xmlns:p14="http://schemas.microsoft.com/office/powerpoint/2010/main">
+    <mc:Choice Requires="p14">
       <p:transition spd="slow">
         <p14:pan/>
       </p:transition>
     </mc:Choice>
-    <mc:Fallback>
+    <mc:Fallback xmlns="">
       <p:transition spd="slow">
         <p:fade/>
       </p:transition>
@@ -10218,7 +10218,7 @@
           <a:p>
             <a:fld id="{9DE49396-A74B-4A7F-9FEA-5C0D177F4AF6}" type="datetime1">
               <a:rPr lang="de-AT" smtClean="0"/>
-              <a:t>05.03.2019</a:t>
+              <a:t>06.03.2019</a:t>
             </a:fld>
             <a:endParaRPr lang="de-AT"/>
           </a:p>
@@ -10291,13 +10291,13 @@
   <p:clrMapOvr>
     <a:masterClrMapping/>
   </p:clrMapOvr>
-  <mc:AlternateContent xmlns:mc="http://schemas.openxmlformats.org/markup-compatibility/2006">
-    <mc:Choice xmlns:p14="http://schemas.microsoft.com/office/powerpoint/2010/main" Requires="p14">
+  <mc:AlternateContent xmlns:mc="http://schemas.openxmlformats.org/markup-compatibility/2006" xmlns:p14="http://schemas.microsoft.com/office/powerpoint/2010/main">
+    <mc:Choice Requires="p14">
       <p:transition spd="slow">
         <p14:pan/>
       </p:transition>
     </mc:Choice>
-    <mc:Fallback>
+    <mc:Fallback xmlns="">
       <p:transition spd="slow">
         <p:fade/>
       </p:transition>
@@ -10522,7 +10522,7 @@
           <a:p>
             <a:fld id="{5C8883B4-AE7B-4968-9F85-1D972A8B114A}" type="datetime1">
               <a:rPr lang="de-AT" smtClean="0"/>
-              <a:t>05.03.2019</a:t>
+              <a:t>06.03.2019</a:t>
             </a:fld>
             <a:endParaRPr lang="de-AT"/>
           </a:p>
@@ -10595,13 +10595,13 @@
   <p:clrMapOvr>
     <a:masterClrMapping/>
   </p:clrMapOvr>
-  <mc:AlternateContent xmlns:mc="http://schemas.openxmlformats.org/markup-compatibility/2006">
-    <mc:Choice xmlns:p14="http://schemas.microsoft.com/office/powerpoint/2010/main" Requires="p14">
+  <mc:AlternateContent xmlns:mc="http://schemas.openxmlformats.org/markup-compatibility/2006" xmlns:p14="http://schemas.microsoft.com/office/powerpoint/2010/main">
+    <mc:Choice Requires="p14">
       <p:transition spd="slow">
         <p14:pan/>
       </p:transition>
     </mc:Choice>
-    <mc:Fallback>
+    <mc:Fallback xmlns="">
       <p:transition spd="slow">
         <p:fade/>
       </p:transition>
@@ -10783,7 +10783,7 @@
           <a:p>
             <a:fld id="{67614832-DF44-4D59-A3C8-8BBE1533FF73}" type="datetime1">
               <a:rPr lang="de-AT" smtClean="0"/>
-              <a:t>05.03.2019</a:t>
+              <a:t>06.03.2019</a:t>
             </a:fld>
             <a:endParaRPr lang="de-AT"/>
           </a:p>
@@ -10903,13 +10903,13 @@
     <p:sldLayoutId id="2147483658" r:id="rId10"/>
     <p:sldLayoutId id="2147483659" r:id="rId11"/>
   </p:sldLayoutIdLst>
-  <mc:AlternateContent xmlns:mc="http://schemas.openxmlformats.org/markup-compatibility/2006">
-    <mc:Choice xmlns:p14="http://schemas.microsoft.com/office/powerpoint/2010/main" Requires="p14">
+  <mc:AlternateContent xmlns:mc="http://schemas.openxmlformats.org/markup-compatibility/2006" xmlns:p14="http://schemas.microsoft.com/office/powerpoint/2010/main">
+    <mc:Choice Requires="p14">
       <p:transition spd="slow">
         <p14:pan/>
       </p:transition>
     </mc:Choice>
-    <mc:Fallback>
+    <mc:Fallback xmlns="">
       <p:transition spd="slow">
         <p:fade/>
       </p:transition>
@@ -11514,13 +11514,13 @@
   <p:clrMapOvr>
     <a:masterClrMapping/>
   </p:clrMapOvr>
-  <mc:AlternateContent xmlns:mc="http://schemas.openxmlformats.org/markup-compatibility/2006">
-    <mc:Choice xmlns:p14="http://schemas.microsoft.com/office/powerpoint/2010/main" Requires="p14">
+  <mc:AlternateContent xmlns:mc="http://schemas.openxmlformats.org/markup-compatibility/2006" xmlns:p14="http://schemas.microsoft.com/office/powerpoint/2010/main">
+    <mc:Choice Requires="p14">
       <p:transition spd="slow" p14:dur="1500">
         <p14:window dir="vert"/>
       </p:transition>
     </mc:Choice>
-    <mc:Fallback>
+    <mc:Fallback xmlns="">
       <p:transition spd="slow">
         <p:fade/>
       </p:transition>
@@ -11659,8 +11659,23 @@
               </a:lnSpc>
             </a:pPr>
             <a:r>
+              <a:rPr lang="de-DE" dirty="0" err="1"/>
+              <a:t>Wireframes</a:t>
+            </a:r>
+            <a:r>
               <a:rPr lang="de-DE" dirty="0"/>
-              <a:t>IBM Cloud einrichten</a:t>
+              <a:t> erstellen						20.03.2019</a:t>
+            </a:r>
+          </a:p>
+          <a:p>
+            <a:pPr>
+              <a:lnSpc>
+                <a:spcPct val="150000"/>
+              </a:lnSpc>
+            </a:pPr>
+            <a:r>
+              <a:rPr lang="de-DE" dirty="0"/>
+              <a:t>IBM Cloud einrichten						27.03.2019</a:t>
             </a:r>
           </a:p>
           <a:p>
@@ -11675,11 +11690,11 @@
             </a:r>
             <a:r>
               <a:rPr lang="de-DE" dirty="0" err="1"/>
-              <a:t>IoT-Platform</a:t>
+              <a:t>IoT</a:t>
             </a:r>
             <a:r>
               <a:rPr lang="de-DE" dirty="0"/>
-              <a:t> registrieren</a:t>
+              <a:t>-Plattform registrieren		03.04.2019</a:t>
             </a:r>
           </a:p>
           <a:p>
@@ -11690,7 +11705,7 @@
             </a:pPr>
             <a:r>
               <a:rPr lang="de-DE" dirty="0"/>
-              <a:t>Message Handler einrichten</a:t>
+              <a:t>Frontend Prototyp erstellen					27.04.2019</a:t>
             </a:r>
           </a:p>
           <a:p>
@@ -11701,22 +11716,7 @@
             </a:pPr>
             <a:r>
               <a:rPr lang="de-DE" dirty="0"/>
-              <a:t>Datenbank aufsetzen &amp; DB Handler einrichten</a:t>
-            </a:r>
-          </a:p>
-          <a:p>
-            <a:pPr>
-              <a:lnSpc>
-                <a:spcPct val="150000"/>
-              </a:lnSpc>
-            </a:pPr>
-            <a:r>
-              <a:rPr lang="de-DE" dirty="0" err="1"/>
-              <a:t>Wireframes</a:t>
-            </a:r>
-            <a:r>
-              <a:rPr lang="de-DE" dirty="0"/>
-              <a:t> erstellen</a:t>
+              <a:t>Message Handler einrichten					27.04.2019</a:t>
             </a:r>
           </a:p>
           <a:p>
@@ -11727,7 +11727,7 @@
             </a:pPr>
             <a:r>
               <a:rPr lang="de-DE" dirty="0"/>
-              <a:t>Frontend Prototyp erstellen</a:t>
+              <a:t>Datenbank aufsetzen &amp; DB Handler einrichten		08.05.2019</a:t>
             </a:r>
           </a:p>
           <a:p>
@@ -11836,13 +11836,13 @@
   <p:clrMapOvr>
     <a:masterClrMapping/>
   </p:clrMapOvr>
-  <mc:AlternateContent xmlns:mc="http://schemas.openxmlformats.org/markup-compatibility/2006">
-    <mc:Choice xmlns:p14="http://schemas.microsoft.com/office/powerpoint/2010/main" Requires="p14">
+  <mc:AlternateContent xmlns:mc="http://schemas.openxmlformats.org/markup-compatibility/2006" xmlns:p14="http://schemas.microsoft.com/office/powerpoint/2010/main">
+    <mc:Choice Requires="p14">
       <p:transition spd="slow">
         <p14:pan/>
       </p:transition>
     </mc:Choice>
-    <mc:Fallback>
+    <mc:Fallback xmlns="">
       <p:transition spd="slow">
         <p:fade/>
       </p:transition>
@@ -12097,7 +12097,7 @@
           <a:p>
             <a:r>
               <a:rPr lang="de-AT" sz="2800" dirty="0"/>
-              <a:t>Eingeplante Stunden: 200</a:t>
+              <a:t>Eingeplante Stunden: 250</a:t>
             </a:r>
           </a:p>
         </p:txBody>
@@ -12148,13 +12148,13 @@
   <p:clrMapOvr>
     <a:masterClrMapping/>
   </p:clrMapOvr>
-  <mc:AlternateContent xmlns:mc="http://schemas.openxmlformats.org/markup-compatibility/2006">
-    <mc:Choice xmlns:p14="http://schemas.microsoft.com/office/powerpoint/2010/main" Requires="p14">
+  <mc:AlternateContent xmlns:mc="http://schemas.openxmlformats.org/markup-compatibility/2006" xmlns:p14="http://schemas.microsoft.com/office/powerpoint/2010/main">
+    <mc:Choice Requires="p14">
       <p:transition spd="slow">
         <p14:pan/>
       </p:transition>
     </mc:Choice>
-    <mc:Fallback>
+    <mc:Fallback xmlns="">
       <p:transition spd="slow">
         <p:fade/>
       </p:transition>
@@ -12408,13 +12408,13 @@
   <p:clrMapOvr>
     <a:masterClrMapping/>
   </p:clrMapOvr>
-  <mc:AlternateContent xmlns:mc="http://schemas.openxmlformats.org/markup-compatibility/2006">
-    <mc:Choice xmlns:p14="http://schemas.microsoft.com/office/powerpoint/2010/main" Requires="p14">
+  <mc:AlternateContent xmlns:mc="http://schemas.openxmlformats.org/markup-compatibility/2006" xmlns:p14="http://schemas.microsoft.com/office/powerpoint/2010/main">
+    <mc:Choice Requires="p14">
       <p:transition spd="slow">
         <p14:pan/>
       </p:transition>
     </mc:Choice>
-    <mc:Fallback>
+    <mc:Fallback xmlns="">
       <p:transition spd="slow">
         <p:fade/>
       </p:transition>
@@ -12738,13 +12738,13 @@
   <p:clrMapOvr>
     <a:masterClrMapping/>
   </p:clrMapOvr>
-  <mc:AlternateContent xmlns:mc="http://schemas.openxmlformats.org/markup-compatibility/2006">
-    <mc:Choice xmlns:p14="http://schemas.microsoft.com/office/powerpoint/2010/main" Requires="p14">
+  <mc:AlternateContent xmlns:mc="http://schemas.openxmlformats.org/markup-compatibility/2006" xmlns:p14="http://schemas.microsoft.com/office/powerpoint/2010/main">
+    <mc:Choice Requires="p14">
       <p:transition spd="slow">
         <p14:pan/>
       </p:transition>
     </mc:Choice>
-    <mc:Fallback>
+    <mc:Fallback xmlns="">
       <p:transition spd="slow">
         <p:fade/>
       </p:transition>
@@ -12854,13 +12854,13 @@
   <p:clrMapOvr>
     <a:masterClrMapping/>
   </p:clrMapOvr>
-  <mc:AlternateContent xmlns:mc="http://schemas.openxmlformats.org/markup-compatibility/2006">
-    <mc:Choice xmlns:p14="http://schemas.microsoft.com/office/powerpoint/2010/main" Requires="p14">
+  <mc:AlternateContent xmlns:mc="http://schemas.openxmlformats.org/markup-compatibility/2006" xmlns:p14="http://schemas.microsoft.com/office/powerpoint/2010/main">
+    <mc:Choice Requires="p14">
       <p:transition spd="slow">
         <p14:pan/>
       </p:transition>
     </mc:Choice>
-    <mc:Fallback>
+    <mc:Fallback xmlns="">
       <p:transition spd="slow">
         <p:fade/>
       </p:transition>
@@ -13066,13 +13066,13 @@
   <p:clrMapOvr>
     <a:masterClrMapping/>
   </p:clrMapOvr>
-  <mc:AlternateContent xmlns:mc="http://schemas.openxmlformats.org/markup-compatibility/2006">
-    <mc:Choice xmlns:p14="http://schemas.microsoft.com/office/powerpoint/2010/main" Requires="p14">
+  <mc:AlternateContent xmlns:mc="http://schemas.openxmlformats.org/markup-compatibility/2006" xmlns:p14="http://schemas.microsoft.com/office/powerpoint/2010/main">
+    <mc:Choice Requires="p14">
       <p:transition spd="slow" p14:dur="1300">
         <p14:pan/>
       </p:transition>
     </mc:Choice>
-    <mc:Fallback>
+    <mc:Fallback xmlns="">
       <p:transition spd="slow">
         <p:fade/>
       </p:transition>
@@ -13278,11 +13278,11 @@
   <p:clrMapOvr>
     <a:masterClrMapping/>
   </p:clrMapOvr>
-  <mc:AlternateContent xmlns:mc="http://schemas.openxmlformats.org/markup-compatibility/2006">
-    <mc:Choice xmlns:p14="http://schemas.microsoft.com/office/powerpoint/2010/main" Requires="p14">
+  <mc:AlternateContent xmlns:mc="http://schemas.openxmlformats.org/markup-compatibility/2006" xmlns:p14="http://schemas.microsoft.com/office/powerpoint/2010/main">
+    <mc:Choice Requires="p14">
       <p:transition p14:dur="0"/>
     </mc:Choice>
-    <mc:Fallback>
+    <mc:Fallback xmlns="">
       <p:transition/>
     </mc:Fallback>
   </mc:AlternateContent>
@@ -13486,11 +13486,11 @@
   <p:clrMapOvr>
     <a:masterClrMapping/>
   </p:clrMapOvr>
-  <mc:AlternateContent xmlns:mc="http://schemas.openxmlformats.org/markup-compatibility/2006">
-    <mc:Choice xmlns:p14="http://schemas.microsoft.com/office/powerpoint/2010/main" Requires="p14">
+  <mc:AlternateContent xmlns:mc="http://schemas.openxmlformats.org/markup-compatibility/2006" xmlns:p14="http://schemas.microsoft.com/office/powerpoint/2010/main">
+    <mc:Choice Requires="p14">
       <p:transition p14:dur="0"/>
     </mc:Choice>
-    <mc:Fallback>
+    <mc:Fallback xmlns="">
       <p:transition/>
     </mc:Fallback>
   </mc:AlternateContent>
@@ -14809,13 +14809,13 @@
   <p:clrMapOvr>
     <a:masterClrMapping/>
   </p:clrMapOvr>
-  <mc:AlternateContent xmlns:mc="http://schemas.openxmlformats.org/markup-compatibility/2006">
-    <mc:Choice xmlns:p14="http://schemas.microsoft.com/office/powerpoint/2010/main" Requires="p14">
+  <mc:AlternateContent xmlns:mc="http://schemas.openxmlformats.org/markup-compatibility/2006" xmlns:p14="http://schemas.microsoft.com/office/powerpoint/2010/main">
+    <mc:Choice Requires="p14">
       <p:transition spd="slow">
         <p14:pan/>
       </p:transition>
     </mc:Choice>
-    <mc:Fallback>
+    <mc:Fallback xmlns="">
       <p:transition spd="slow">
         <p:fade/>
       </p:transition>
@@ -15089,13 +15089,13 @@
   <p:clrMapOvr>
     <a:masterClrMapping/>
   </p:clrMapOvr>
-  <mc:AlternateContent xmlns:mc="http://schemas.openxmlformats.org/markup-compatibility/2006">
-    <mc:Choice xmlns:p14="http://schemas.microsoft.com/office/powerpoint/2010/main" Requires="p14">
+  <mc:AlternateContent xmlns:mc="http://schemas.openxmlformats.org/markup-compatibility/2006" xmlns:p14="http://schemas.microsoft.com/office/powerpoint/2010/main">
+    <mc:Choice Requires="p14">
       <p:transition spd="slow">
         <p14:pan/>
       </p:transition>
     </mc:Choice>
-    <mc:Fallback>
+    <mc:Fallback xmlns="">
       <p:transition spd="slow">
         <p:fade/>
       </p:transition>
@@ -15457,13 +15457,13 @@
   <p:clrMapOvr>
     <a:masterClrMapping/>
   </p:clrMapOvr>
-  <mc:AlternateContent xmlns:mc="http://schemas.openxmlformats.org/markup-compatibility/2006">
-    <mc:Choice xmlns:p14="http://schemas.microsoft.com/office/powerpoint/2010/main" Requires="p14">
+  <mc:AlternateContent xmlns:mc="http://schemas.openxmlformats.org/markup-compatibility/2006" xmlns:p14="http://schemas.microsoft.com/office/powerpoint/2010/main">
+    <mc:Choice Requires="p14">
       <p:transition spd="slow">
         <p14:pan/>
       </p:transition>
     </mc:Choice>
-    <mc:Fallback>
+    <mc:Fallback xmlns="">
       <p:transition spd="slow">
         <p:fade/>
       </p:transition>
@@ -15694,13 +15694,13 @@
   <p:clrMapOvr>
     <a:masterClrMapping/>
   </p:clrMapOvr>
-  <mc:AlternateContent xmlns:mc="http://schemas.openxmlformats.org/markup-compatibility/2006">
-    <mc:Choice xmlns:p14="http://schemas.microsoft.com/office/powerpoint/2010/main" Requires="p14">
+  <mc:AlternateContent xmlns:mc="http://schemas.openxmlformats.org/markup-compatibility/2006" xmlns:p14="http://schemas.microsoft.com/office/powerpoint/2010/main">
+    <mc:Choice Requires="p14">
       <p:transition spd="slow">
         <p14:pan/>
       </p:transition>
     </mc:Choice>
-    <mc:Fallback>
+    <mc:Fallback xmlns="">
       <p:transition spd="slow">
         <p:fade/>
       </p:transition>

</xml_diff>